<commit_message>
cap nhat so do phan manh
</commit_message>
<xml_diff>
--- a/sodophanmanh.pptx
+++ b/sodophanmanh.pptx
@@ -104,6 +104,11 @@
       </a:defRPr>
     </a:lvl9pPr>
   </p:defaultTextStyle>
+  <p:extLst>
+    <p:ext uri="{EFAFB233-063F-42B5-8137-9DF3F51BA10A}">
+      <p15:sldGuideLst xmlns:p15="http://schemas.microsoft.com/office/powerpoint/2012/main"/>
+    </p:ext>
+  </p:extLst>
 </p:presentation>
 </file>
 
@@ -2966,13 +2971,13 @@
       </p:grpSpPr>
       <p:sp>
         <p:nvSpPr>
-          <p:cNvPr id="4" name="Rounded Rectangle 3"/>
+          <p:cNvPr id="5" name="Rounded Rectangle 4"/>
           <p:cNvSpPr/>
           <p:nvPr/>
         </p:nvSpPr>
         <p:spPr>
           <a:xfrm>
-            <a:off x="5196255" y="131886"/>
+            <a:off x="2372826" y="1897728"/>
             <a:ext cx="1310054" cy="369276"/>
           </a:xfrm>
           <a:prstGeom prst="roundRect">
@@ -3001,8 +3006,8 @@
           <a:p>
             <a:pPr algn="ctr"/>
             <a:r>
-              <a:rPr lang="en-US" dirty="0" err="1" smtClean="0"/>
-              <a:t>ChiNhanh</a:t>
+              <a:rPr lang="en-US" dirty="0" smtClean="0"/>
+              <a:t>ChiNhanh1</a:t>
             </a:r>
             <a:endParaRPr lang="en-US" dirty="0"/>
           </a:p>
@@ -3010,13 +3015,13 @@
       </p:sp>
       <p:sp>
         <p:nvSpPr>
-          <p:cNvPr id="5" name="Rounded Rectangle 4"/>
+          <p:cNvPr id="6" name="Rounded Rectangle 5"/>
           <p:cNvSpPr/>
           <p:nvPr/>
         </p:nvSpPr>
         <p:spPr>
           <a:xfrm>
-            <a:off x="2508739" y="882163"/>
+            <a:off x="8812825" y="1905774"/>
             <a:ext cx="1310054" cy="369276"/>
           </a:xfrm>
           <a:prstGeom prst="roundRect">
@@ -3046,7 +3051,7 @@
             <a:pPr algn="ctr"/>
             <a:r>
               <a:rPr lang="en-US" dirty="0" smtClean="0"/>
-              <a:t>ChiNhanh1</a:t>
+              <a:t>ChiNhanh2</a:t>
             </a:r>
             <a:endParaRPr lang="en-US" dirty="0"/>
           </a:p>
@@ -3054,13 +3059,13 @@
       </p:sp>
       <p:sp>
         <p:nvSpPr>
-          <p:cNvPr id="6" name="Rounded Rectangle 5"/>
+          <p:cNvPr id="14" name="Rounded Rectangle 13"/>
           <p:cNvSpPr/>
           <p:nvPr/>
         </p:nvSpPr>
         <p:spPr>
           <a:xfrm>
-            <a:off x="7748955" y="882163"/>
+            <a:off x="1062772" y="2747651"/>
             <a:ext cx="1310054" cy="369276"/>
           </a:xfrm>
           <a:prstGeom prst="roundRect">
@@ -3090,153 +3095,21 @@
             <a:pPr algn="ctr"/>
             <a:r>
               <a:rPr lang="en-US" dirty="0" smtClean="0"/>
-              <a:t>ChiNhanh2</a:t>
+              <a:t>DuAn1</a:t>
             </a:r>
             <a:endParaRPr lang="en-US" dirty="0"/>
           </a:p>
         </p:txBody>
       </p:sp>
-      <p:cxnSp>
-        <p:nvCxnSpPr>
-          <p:cNvPr id="8" name="Straight Arrow Connector 7"/>
-          <p:cNvCxnSpPr>
-            <a:stCxn id="4" idx="1"/>
-            <a:endCxn id="5" idx="3"/>
-          </p:cNvCxnSpPr>
-          <p:nvPr/>
-        </p:nvCxnSpPr>
-        <p:spPr>
-          <a:xfrm flipH="1">
-            <a:off x="3818793" y="316524"/>
-            <a:ext cx="1377462" cy="750277"/>
-          </a:xfrm>
-          <a:prstGeom prst="straightConnector1">
-            <a:avLst/>
-          </a:prstGeom>
-          <a:ln>
-            <a:tailEnd type="triangle"/>
-          </a:ln>
-        </p:spPr>
-        <p:style>
-          <a:lnRef idx="1">
-            <a:schemeClr val="accent1"/>
-          </a:lnRef>
-          <a:fillRef idx="0">
-            <a:schemeClr val="accent1"/>
-          </a:fillRef>
-          <a:effectRef idx="0">
-            <a:schemeClr val="accent1"/>
-          </a:effectRef>
-          <a:fontRef idx="minor">
-            <a:schemeClr val="tx1"/>
-          </a:fontRef>
-        </p:style>
-      </p:cxnSp>
-      <p:cxnSp>
-        <p:nvCxnSpPr>
-          <p:cNvPr id="10" name="Straight Arrow Connector 9"/>
-          <p:cNvCxnSpPr>
-            <a:stCxn id="4" idx="3"/>
-            <a:endCxn id="6" idx="1"/>
-          </p:cNvCxnSpPr>
-          <p:nvPr/>
-        </p:nvCxnSpPr>
-        <p:spPr>
-          <a:xfrm>
-            <a:off x="6506309" y="316524"/>
-            <a:ext cx="1242646" cy="750277"/>
-          </a:xfrm>
-          <a:prstGeom prst="straightConnector1">
-            <a:avLst/>
-          </a:prstGeom>
-          <a:ln>
-            <a:tailEnd type="triangle"/>
-          </a:ln>
-        </p:spPr>
-        <p:style>
-          <a:lnRef idx="1">
-            <a:schemeClr val="accent1"/>
-          </a:lnRef>
-          <a:fillRef idx="0">
-            <a:schemeClr val="accent1"/>
-          </a:fillRef>
-          <a:effectRef idx="0">
-            <a:schemeClr val="accent1"/>
-          </a:effectRef>
-          <a:fontRef idx="minor">
-            <a:schemeClr val="tx1"/>
-          </a:fontRef>
-        </p:style>
-      </p:cxnSp>
-      <p:sp>
-        <p:nvSpPr>
-          <p:cNvPr id="11" name="TextBox 10"/>
-          <p:cNvSpPr txBox="1"/>
-          <p:nvPr/>
-        </p:nvSpPr>
-        <p:spPr>
-          <a:xfrm>
-            <a:off x="3886201" y="316496"/>
-            <a:ext cx="876301" cy="369332"/>
-          </a:xfrm>
-          <a:prstGeom prst="rect">
-            <a:avLst/>
-          </a:prstGeom>
-          <a:noFill/>
-        </p:spPr>
-        <p:txBody>
-          <a:bodyPr wrap="square" rtlCol="0">
-            <a:spAutoFit/>
-          </a:bodyPr>
-          <a:lstStyle/>
-          <a:p>
-            <a:r>
-              <a:rPr lang="en-US" dirty="0" smtClean="0"/>
-              <a:t>ID=1</a:t>
-            </a:r>
-            <a:endParaRPr lang="en-US" dirty="0"/>
-          </a:p>
-        </p:txBody>
-      </p:sp>
-      <p:sp>
-        <p:nvSpPr>
-          <p:cNvPr id="12" name="TextBox 11"/>
-          <p:cNvSpPr txBox="1"/>
-          <p:nvPr/>
-        </p:nvSpPr>
-        <p:spPr>
-          <a:xfrm>
-            <a:off x="6940062" y="262223"/>
-            <a:ext cx="876301" cy="369332"/>
-          </a:xfrm>
-          <a:prstGeom prst="rect">
-            <a:avLst/>
-          </a:prstGeom>
-          <a:noFill/>
-        </p:spPr>
-        <p:txBody>
-          <a:bodyPr wrap="square" rtlCol="0">
-            <a:spAutoFit/>
-          </a:bodyPr>
-          <a:lstStyle/>
-          <a:p>
-            <a:r>
-              <a:rPr lang="en-US" dirty="0" smtClean="0"/>
-              <a:t>ID=2</a:t>
-            </a:r>
-            <a:endParaRPr lang="en-US" dirty="0"/>
-          </a:p>
-        </p:txBody>
-      </p:sp>
-      <p:sp>
-        <p:nvSpPr>
-          <p:cNvPr id="14" name="Rounded Rectangle 13"/>
+      <p:sp>
+        <p:nvSpPr>
+          <p:cNvPr id="15" name="Rounded Rectangle 14"/>
           <p:cNvSpPr/>
           <p:nvPr/>
         </p:nvSpPr>
         <p:spPr>
           <a:xfrm>
-            <a:off x="1198685" y="1732086"/>
+            <a:off x="10122879" y="2755698"/>
             <a:ext cx="1310054" cy="369276"/>
           </a:xfrm>
           <a:prstGeom prst="roundRect">
@@ -3266,7 +3139,7 @@
             <a:pPr algn="ctr"/>
             <a:r>
               <a:rPr lang="en-US" dirty="0" smtClean="0"/>
-              <a:t>DuAn1</a:t>
+              <a:t>NhanVien2</a:t>
             </a:r>
             <a:endParaRPr lang="en-US" dirty="0"/>
           </a:p>
@@ -3274,13 +3147,13 @@
       </p:sp>
       <p:sp>
         <p:nvSpPr>
-          <p:cNvPr id="15" name="Rounded Rectangle 14"/>
+          <p:cNvPr id="16" name="Rounded Rectangle 15"/>
           <p:cNvSpPr/>
           <p:nvPr/>
         </p:nvSpPr>
         <p:spPr>
           <a:xfrm>
-            <a:off x="9059009" y="1732087"/>
+            <a:off x="3682880" y="2747651"/>
             <a:ext cx="1310054" cy="369276"/>
           </a:xfrm>
           <a:prstGeom prst="roundRect">
@@ -3310,50 +3183,6 @@
             <a:pPr algn="ctr"/>
             <a:r>
               <a:rPr lang="en-US" dirty="0" smtClean="0"/>
-              <a:t>NhanVien2</a:t>
-            </a:r>
-            <a:endParaRPr lang="en-US" dirty="0"/>
-          </a:p>
-        </p:txBody>
-      </p:sp>
-      <p:sp>
-        <p:nvSpPr>
-          <p:cNvPr id="16" name="Rounded Rectangle 15"/>
-          <p:cNvSpPr/>
-          <p:nvPr/>
-        </p:nvSpPr>
-        <p:spPr>
-          <a:xfrm>
-            <a:off x="3818793" y="1732086"/>
-            <a:ext cx="1310054" cy="369276"/>
-          </a:xfrm>
-          <a:prstGeom prst="roundRect">
-            <a:avLst/>
-          </a:prstGeom>
-        </p:spPr>
-        <p:style>
-          <a:lnRef idx="2">
-            <a:schemeClr val="accent1">
-              <a:shade val="50000"/>
-            </a:schemeClr>
-          </a:lnRef>
-          <a:fillRef idx="1">
-            <a:schemeClr val="accent1"/>
-          </a:fillRef>
-          <a:effectRef idx="0">
-            <a:schemeClr val="accent1"/>
-          </a:effectRef>
-          <a:fontRef idx="minor">
-            <a:schemeClr val="lt1"/>
-          </a:fontRef>
-        </p:style>
-        <p:txBody>
-          <a:bodyPr rtlCol="0" anchor="ctr"/>
-          <a:lstStyle/>
-          <a:p>
-            <a:pPr algn="ctr"/>
-            <a:r>
-              <a:rPr lang="en-US" dirty="0" smtClean="0"/>
               <a:t>NhanVien1</a:t>
             </a:r>
             <a:endParaRPr lang="en-US" dirty="0"/>
@@ -3368,7 +3197,7 @@
         </p:nvSpPr>
         <p:spPr>
           <a:xfrm>
-            <a:off x="6438901" y="1732086"/>
+            <a:off x="7502771" y="2755697"/>
             <a:ext cx="1310054" cy="369276"/>
           </a:xfrm>
           <a:prstGeom prst="roundRect">
@@ -3415,7 +3244,7 @@
         </p:nvCxnSpPr>
         <p:spPr>
           <a:xfrm flipH="1">
-            <a:off x="1853712" y="1251439"/>
+            <a:off x="1717799" y="2267004"/>
             <a:ext cx="1310054" cy="480647"/>
           </a:xfrm>
           <a:prstGeom prst="line">
@@ -3448,7 +3277,7 @@
         </p:nvCxnSpPr>
         <p:spPr>
           <a:xfrm>
-            <a:off x="3163766" y="1251439"/>
+            <a:off x="3027853" y="2267004"/>
             <a:ext cx="1310054" cy="480647"/>
           </a:xfrm>
           <a:prstGeom prst="line">
@@ -3481,7 +3310,7 @@
         </p:nvCxnSpPr>
         <p:spPr>
           <a:xfrm flipH="1">
-            <a:off x="7093928" y="1251439"/>
+            <a:off x="8157798" y="2275050"/>
             <a:ext cx="1310054" cy="480647"/>
           </a:xfrm>
           <a:prstGeom prst="straightConnector1">
@@ -3517,7 +3346,7 @@
         </p:nvCxnSpPr>
         <p:spPr>
           <a:xfrm>
-            <a:off x="8403982" y="1251439"/>
+            <a:off x="9467852" y="2275050"/>
             <a:ext cx="1310054" cy="480648"/>
           </a:xfrm>
           <a:prstGeom prst="straightConnector1">
@@ -3550,7 +3379,7 @@
         </p:nvSpPr>
         <p:spPr>
           <a:xfrm>
-            <a:off x="2508739" y="2869224"/>
+            <a:off x="2372826" y="3884789"/>
             <a:ext cx="1310054" cy="369276"/>
           </a:xfrm>
           <a:prstGeom prst="roundRect">
@@ -3594,7 +3423,7 @@
         </p:nvSpPr>
         <p:spPr>
           <a:xfrm>
-            <a:off x="7816363" y="2869224"/>
+            <a:off x="8880233" y="3892835"/>
             <a:ext cx="1310054" cy="369276"/>
           </a:xfrm>
           <a:prstGeom prst="roundRect">
@@ -3641,7 +3470,7 @@
         </p:nvCxnSpPr>
         <p:spPr>
           <a:xfrm>
-            <a:off x="1853712" y="2101362"/>
+            <a:off x="1717799" y="3116927"/>
             <a:ext cx="1310054" cy="767862"/>
           </a:xfrm>
           <a:prstGeom prst="line">
@@ -3674,7 +3503,7 @@
         </p:nvCxnSpPr>
         <p:spPr>
           <a:xfrm flipH="1">
-            <a:off x="3163766" y="2101362"/>
+            <a:off x="3027853" y="3116927"/>
             <a:ext cx="1310054" cy="767862"/>
           </a:xfrm>
           <a:prstGeom prst="straightConnector1">
@@ -3710,7 +3539,7 @@
         </p:nvCxnSpPr>
         <p:spPr>
           <a:xfrm>
-            <a:off x="7093928" y="2101362"/>
+            <a:off x="8157798" y="3124973"/>
             <a:ext cx="1377462" cy="767862"/>
           </a:xfrm>
           <a:prstGeom prst="straightConnector1">
@@ -3746,7 +3575,7 @@
         </p:nvCxnSpPr>
         <p:spPr>
           <a:xfrm flipH="1">
-            <a:off x="8471390" y="2101363"/>
+            <a:off x="9535260" y="3124974"/>
             <a:ext cx="1242646" cy="767861"/>
           </a:xfrm>
           <a:prstGeom prst="straightConnector1">
@@ -3779,7 +3608,7 @@
         </p:nvSpPr>
         <p:spPr>
           <a:xfrm>
-            <a:off x="5196255" y="2869224"/>
+            <a:off x="4602592" y="3860597"/>
             <a:ext cx="1310054" cy="369276"/>
           </a:xfrm>
           <a:prstGeom prst="roundRect">
@@ -3819,15 +3648,14 @@
         <p:nvCxnSpPr>
           <p:cNvPr id="43" name="Straight Arrow Connector 42"/>
           <p:cNvCxnSpPr>
-            <a:stCxn id="41" idx="1"/>
             <a:endCxn id="30" idx="3"/>
           </p:cNvCxnSpPr>
           <p:nvPr/>
         </p:nvCxnSpPr>
         <p:spPr>
           <a:xfrm flipH="1">
-            <a:off x="3818793" y="3053862"/>
-            <a:ext cx="1377462" cy="0"/>
+            <a:off x="3682880" y="4069427"/>
+            <a:ext cx="948837" cy="0"/>
           </a:xfrm>
           <a:prstGeom prst="straightConnector1">
             <a:avLst/>
@@ -3851,42 +3679,6 @@
           </a:fontRef>
         </p:style>
       </p:cxnSp>
-      <p:cxnSp>
-        <p:nvCxnSpPr>
-          <p:cNvPr id="45" name="Straight Arrow Connector 44"/>
-          <p:cNvCxnSpPr>
-            <a:stCxn id="41" idx="3"/>
-            <a:endCxn id="31" idx="1"/>
-          </p:cNvCxnSpPr>
-          <p:nvPr/>
-        </p:nvCxnSpPr>
-        <p:spPr>
-          <a:xfrm>
-            <a:off x="6506309" y="3053862"/>
-            <a:ext cx="1310054" cy="0"/>
-          </a:xfrm>
-          <a:prstGeom prst="straightConnector1">
-            <a:avLst/>
-          </a:prstGeom>
-          <a:ln>
-            <a:tailEnd type="triangle"/>
-          </a:ln>
-        </p:spPr>
-        <p:style>
-          <a:lnRef idx="1">
-            <a:schemeClr val="accent1"/>
-          </a:lnRef>
-          <a:fillRef idx="0">
-            <a:schemeClr val="accent1"/>
-          </a:fillRef>
-          <a:effectRef idx="0">
-            <a:schemeClr val="accent1"/>
-          </a:effectRef>
-          <a:fontRef idx="minor">
-            <a:schemeClr val="tx1"/>
-          </a:fontRef>
-        </p:style>
-      </p:cxnSp>
       <p:sp>
         <p:nvSpPr>
           <p:cNvPr id="46" name="Rounded Rectangle 45"/>
@@ -3895,7 +3687,7 @@
         </p:nvSpPr>
         <p:spPr>
           <a:xfrm>
-            <a:off x="7816363" y="4191000"/>
+            <a:off x="8880233" y="5214611"/>
             <a:ext cx="1310054" cy="369276"/>
           </a:xfrm>
           <a:prstGeom prst="roundRect">
@@ -3939,7 +3731,7 @@
         </p:nvSpPr>
         <p:spPr>
           <a:xfrm>
-            <a:off x="2508739" y="4191000"/>
+            <a:off x="2372826" y="5206565"/>
             <a:ext cx="1310054" cy="369276"/>
           </a:xfrm>
           <a:prstGeom prst="roundRect">
@@ -3985,7 +3777,7 @@
         </p:nvCxnSpPr>
         <p:spPr>
           <a:xfrm>
-            <a:off x="3163766" y="3238500"/>
+            <a:off x="3027853" y="4254065"/>
             <a:ext cx="1" cy="1060938"/>
           </a:xfrm>
           <a:prstGeom prst="straightConnector1">
@@ -4021,7 +3813,7 @@
         </p:nvCxnSpPr>
         <p:spPr>
           <a:xfrm>
-            <a:off x="8471390" y="3238500"/>
+            <a:off x="9535260" y="4262111"/>
             <a:ext cx="0" cy="952500"/>
           </a:xfrm>
           <a:prstGeom prst="straightConnector1">
@@ -4054,7 +3846,7 @@
         </p:nvSpPr>
         <p:spPr>
           <a:xfrm>
-            <a:off x="1654420" y="1194207"/>
+            <a:off x="1518507" y="2209772"/>
             <a:ext cx="888023" cy="369332"/>
           </a:xfrm>
           <a:prstGeom prst="rect">
@@ -4084,7 +3876,7 @@
         </p:nvSpPr>
         <p:spPr>
           <a:xfrm>
-            <a:off x="3996104" y="1189039"/>
+            <a:off x="3860191" y="2204604"/>
             <a:ext cx="888023" cy="369332"/>
           </a:xfrm>
           <a:prstGeom prst="rect">
@@ -4114,7 +3906,7 @@
         </p:nvSpPr>
         <p:spPr>
           <a:xfrm>
-            <a:off x="6977430" y="1191250"/>
+            <a:off x="8041300" y="2214861"/>
             <a:ext cx="888023" cy="369332"/>
           </a:xfrm>
           <a:prstGeom prst="rect">
@@ -4144,7 +3936,7 @@
         </p:nvSpPr>
         <p:spPr>
           <a:xfrm>
-            <a:off x="9358680" y="1251439"/>
+            <a:off x="10422550" y="2275050"/>
             <a:ext cx="888023" cy="369332"/>
           </a:xfrm>
           <a:prstGeom prst="rect">
@@ -4174,7 +3966,7 @@
         </p:nvSpPr>
         <p:spPr>
           <a:xfrm>
-            <a:off x="1613388" y="2263326"/>
+            <a:off x="1477475" y="3278891"/>
             <a:ext cx="888023" cy="369332"/>
           </a:xfrm>
           <a:prstGeom prst="rect">
@@ -4204,7 +3996,7 @@
         </p:nvSpPr>
         <p:spPr>
           <a:xfrm>
-            <a:off x="3996104" y="2263326"/>
+            <a:off x="3860191" y="3278891"/>
             <a:ext cx="888023" cy="369332"/>
           </a:xfrm>
           <a:prstGeom prst="rect">
@@ -4234,7 +4026,7 @@
         </p:nvSpPr>
         <p:spPr>
           <a:xfrm>
-            <a:off x="6928340" y="2208280"/>
+            <a:off x="7992210" y="3231891"/>
             <a:ext cx="888023" cy="369332"/>
           </a:xfrm>
           <a:prstGeom prst="rect">
@@ -4264,7 +4056,7 @@
         </p:nvSpPr>
         <p:spPr>
           <a:xfrm>
-            <a:off x="9362347" y="2217072"/>
+            <a:off x="10426217" y="3240683"/>
             <a:ext cx="888023" cy="369332"/>
           </a:xfrm>
           <a:prstGeom prst="rect">
@@ -4294,7 +4086,7 @@
         </p:nvSpPr>
         <p:spPr>
           <a:xfrm>
-            <a:off x="2501411" y="3525022"/>
+            <a:off x="2365498" y="4540587"/>
             <a:ext cx="888023" cy="369332"/>
           </a:xfrm>
           <a:prstGeom prst="rect">
@@ -4324,7 +4116,7 @@
         </p:nvSpPr>
         <p:spPr>
           <a:xfrm>
-            <a:off x="8484578" y="3584303"/>
+            <a:off x="9548448" y="4607914"/>
             <a:ext cx="888023" cy="369332"/>
           </a:xfrm>
           <a:prstGeom prst="rect">
@@ -4354,7 +4146,7 @@
         </p:nvSpPr>
         <p:spPr>
           <a:xfrm>
-            <a:off x="6871922" y="3102936"/>
+            <a:off x="8075004" y="4107389"/>
             <a:ext cx="888023" cy="369332"/>
           </a:xfrm>
           <a:prstGeom prst="rect">
@@ -4384,7 +4176,7 @@
         </p:nvSpPr>
         <p:spPr>
           <a:xfrm>
-            <a:off x="4158030" y="3053834"/>
+            <a:off x="4022117" y="4069399"/>
             <a:ext cx="888023" cy="369332"/>
           </a:xfrm>
           <a:prstGeom prst="rect">
@@ -4405,6 +4197,393 @@
           </a:p>
         </p:txBody>
       </p:sp>
+      <p:sp>
+        <p:nvSpPr>
+          <p:cNvPr id="42" name="Rounded Rectangle 41"/>
+          <p:cNvSpPr/>
+          <p:nvPr/>
+        </p:nvSpPr>
+        <p:spPr>
+          <a:xfrm>
+            <a:off x="2365498" y="1259541"/>
+            <a:ext cx="1310054" cy="369276"/>
+          </a:xfrm>
+          <a:prstGeom prst="roundRect">
+            <a:avLst/>
+          </a:prstGeom>
+        </p:spPr>
+        <p:style>
+          <a:lnRef idx="2">
+            <a:schemeClr val="accent1">
+              <a:shade val="50000"/>
+            </a:schemeClr>
+          </a:lnRef>
+          <a:fillRef idx="1">
+            <a:schemeClr val="accent1"/>
+          </a:fillRef>
+          <a:effectRef idx="0">
+            <a:schemeClr val="accent1"/>
+          </a:effectRef>
+          <a:fontRef idx="minor">
+            <a:schemeClr val="lt1"/>
+          </a:fontRef>
+        </p:style>
+        <p:txBody>
+          <a:bodyPr rtlCol="0" anchor="ctr"/>
+          <a:lstStyle/>
+          <a:p>
+            <a:pPr algn="ctr"/>
+            <a:r>
+              <a:rPr lang="en-US" dirty="0" err="1" smtClean="0"/>
+              <a:t>Đà</a:t>
+            </a:r>
+            <a:r>
+              <a:rPr lang="en-US" dirty="0" smtClean="0"/>
+              <a:t> </a:t>
+            </a:r>
+            <a:r>
+              <a:rPr lang="en-US" dirty="0" err="1" smtClean="0"/>
+              <a:t>Lạt</a:t>
+            </a:r>
+            <a:endParaRPr lang="en-US" dirty="0"/>
+          </a:p>
+        </p:txBody>
+      </p:sp>
+      <p:sp>
+        <p:nvSpPr>
+          <p:cNvPr id="44" name="Rounded Rectangle 43"/>
+          <p:cNvSpPr/>
+          <p:nvPr/>
+        </p:nvSpPr>
+        <p:spPr>
+          <a:xfrm>
+            <a:off x="8812825" y="1259541"/>
+            <a:ext cx="1310054" cy="369276"/>
+          </a:xfrm>
+          <a:prstGeom prst="roundRect">
+            <a:avLst/>
+          </a:prstGeom>
+        </p:spPr>
+        <p:style>
+          <a:lnRef idx="2">
+            <a:schemeClr val="accent1">
+              <a:shade val="50000"/>
+            </a:schemeClr>
+          </a:lnRef>
+          <a:fillRef idx="1">
+            <a:schemeClr val="accent1"/>
+          </a:fillRef>
+          <a:effectRef idx="0">
+            <a:schemeClr val="accent1"/>
+          </a:effectRef>
+          <a:fontRef idx="minor">
+            <a:schemeClr val="lt1"/>
+          </a:fontRef>
+        </p:style>
+        <p:txBody>
+          <a:bodyPr rtlCol="0" anchor="ctr"/>
+          <a:lstStyle/>
+          <a:p>
+            <a:pPr algn="ctr"/>
+            <a:r>
+              <a:rPr lang="en-US" dirty="0" smtClean="0"/>
+              <a:t>TPHCM</a:t>
+            </a:r>
+            <a:endParaRPr lang="en-US" dirty="0"/>
+          </a:p>
+        </p:txBody>
+      </p:sp>
+      <p:cxnSp>
+        <p:nvCxnSpPr>
+          <p:cNvPr id="3" name="Straight Arrow Connector 2"/>
+          <p:cNvCxnSpPr>
+            <a:stCxn id="42" idx="2"/>
+            <a:endCxn id="5" idx="0"/>
+          </p:cNvCxnSpPr>
+          <p:nvPr/>
+        </p:nvCxnSpPr>
+        <p:spPr>
+          <a:xfrm>
+            <a:off x="3020525" y="1628817"/>
+            <a:ext cx="7328" cy="268911"/>
+          </a:xfrm>
+          <a:prstGeom prst="straightConnector1">
+            <a:avLst/>
+          </a:prstGeom>
+          <a:ln>
+            <a:tailEnd type="triangle"/>
+          </a:ln>
+        </p:spPr>
+        <p:style>
+          <a:lnRef idx="1">
+            <a:schemeClr val="accent1"/>
+          </a:lnRef>
+          <a:fillRef idx="0">
+            <a:schemeClr val="accent1"/>
+          </a:fillRef>
+          <a:effectRef idx="0">
+            <a:schemeClr val="accent1"/>
+          </a:effectRef>
+          <a:fontRef idx="minor">
+            <a:schemeClr val="tx1"/>
+          </a:fontRef>
+        </p:style>
+      </p:cxnSp>
+      <p:cxnSp>
+        <p:nvCxnSpPr>
+          <p:cNvPr id="9" name="Straight Arrow Connector 8"/>
+          <p:cNvCxnSpPr>
+            <a:stCxn id="44" idx="2"/>
+            <a:endCxn id="6" idx="0"/>
+          </p:cNvCxnSpPr>
+          <p:nvPr/>
+        </p:nvCxnSpPr>
+        <p:spPr>
+          <a:xfrm>
+            <a:off x="9467852" y="1628817"/>
+            <a:ext cx="0" cy="276957"/>
+          </a:xfrm>
+          <a:prstGeom prst="straightConnector1">
+            <a:avLst/>
+          </a:prstGeom>
+          <a:ln>
+            <a:tailEnd type="triangle"/>
+          </a:ln>
+        </p:spPr>
+        <p:style>
+          <a:lnRef idx="1">
+            <a:schemeClr val="accent1"/>
+          </a:lnRef>
+          <a:fillRef idx="0">
+            <a:schemeClr val="accent1"/>
+          </a:fillRef>
+          <a:effectRef idx="0">
+            <a:schemeClr val="accent1"/>
+          </a:effectRef>
+          <a:fontRef idx="minor">
+            <a:schemeClr val="tx1"/>
+          </a:fontRef>
+        </p:style>
+      </p:cxnSp>
+      <p:sp>
+        <p:nvSpPr>
+          <p:cNvPr id="50" name="Rounded Rectangle 49"/>
+          <p:cNvSpPr/>
+          <p:nvPr/>
+        </p:nvSpPr>
+        <p:spPr>
+          <a:xfrm>
+            <a:off x="6669703" y="3915064"/>
+            <a:ext cx="1310054" cy="369276"/>
+          </a:xfrm>
+          <a:prstGeom prst="roundRect">
+            <a:avLst/>
+          </a:prstGeom>
+        </p:spPr>
+        <p:style>
+          <a:lnRef idx="2">
+            <a:schemeClr val="accent1">
+              <a:shade val="50000"/>
+            </a:schemeClr>
+          </a:lnRef>
+          <a:fillRef idx="1">
+            <a:schemeClr val="accent1"/>
+          </a:fillRef>
+          <a:effectRef idx="0">
+            <a:schemeClr val="accent1"/>
+          </a:effectRef>
+          <a:fontRef idx="minor">
+            <a:schemeClr val="lt1"/>
+          </a:fontRef>
+        </p:style>
+        <p:txBody>
+          <a:bodyPr rtlCol="0" anchor="ctr"/>
+          <a:lstStyle/>
+          <a:p>
+            <a:pPr algn="ctr"/>
+            <a:r>
+              <a:rPr lang="en-US" dirty="0" err="1" smtClean="0"/>
+              <a:t>VaiTro</a:t>
+            </a:r>
+            <a:endParaRPr lang="en-US" dirty="0"/>
+          </a:p>
+        </p:txBody>
+      </p:sp>
+      <p:cxnSp>
+        <p:nvCxnSpPr>
+          <p:cNvPr id="20" name="Straight Arrow Connector 19"/>
+          <p:cNvCxnSpPr>
+            <a:endCxn id="31" idx="1"/>
+          </p:cNvCxnSpPr>
+          <p:nvPr/>
+        </p:nvCxnSpPr>
+        <p:spPr>
+          <a:xfrm>
+            <a:off x="7979757" y="4077473"/>
+            <a:ext cx="900476" cy="0"/>
+          </a:xfrm>
+          <a:prstGeom prst="straightConnector1">
+            <a:avLst/>
+          </a:prstGeom>
+          <a:ln>
+            <a:tailEnd type="triangle"/>
+          </a:ln>
+        </p:spPr>
+        <p:style>
+          <a:lnRef idx="1">
+            <a:schemeClr val="accent1"/>
+          </a:lnRef>
+          <a:fillRef idx="0">
+            <a:schemeClr val="accent1"/>
+          </a:fillRef>
+          <a:effectRef idx="0">
+            <a:schemeClr val="accent1"/>
+          </a:effectRef>
+          <a:fontRef idx="minor">
+            <a:schemeClr val="tx1"/>
+          </a:fontRef>
+        </p:style>
+      </p:cxnSp>
+      <p:sp>
+        <p:nvSpPr>
+          <p:cNvPr id="54" name="Rounded Rectangle 53"/>
+          <p:cNvSpPr/>
+          <p:nvPr/>
+        </p:nvSpPr>
+        <p:spPr>
+          <a:xfrm>
+            <a:off x="5292968" y="243976"/>
+            <a:ext cx="2092569" cy="369276"/>
+          </a:xfrm>
+          <a:prstGeom prst="roundRect">
+            <a:avLst/>
+          </a:prstGeom>
+        </p:spPr>
+        <p:style>
+          <a:lnRef idx="2">
+            <a:schemeClr val="accent1">
+              <a:shade val="50000"/>
+            </a:schemeClr>
+          </a:lnRef>
+          <a:fillRef idx="1">
+            <a:schemeClr val="accent1"/>
+          </a:fillRef>
+          <a:effectRef idx="0">
+            <a:schemeClr val="accent1"/>
+          </a:effectRef>
+          <a:fontRef idx="minor">
+            <a:schemeClr val="lt1"/>
+          </a:fontRef>
+        </p:style>
+        <p:txBody>
+          <a:bodyPr rtlCol="0" anchor="ctr"/>
+          <a:lstStyle/>
+          <a:p>
+            <a:pPr algn="ctr"/>
+            <a:r>
+              <a:rPr lang="en-US" dirty="0" err="1" smtClean="0"/>
+              <a:t>Quản</a:t>
+            </a:r>
+            <a:r>
+              <a:rPr lang="en-US" dirty="0" smtClean="0"/>
+              <a:t> </a:t>
+            </a:r>
+            <a:r>
+              <a:rPr lang="en-US" dirty="0" err="1" smtClean="0"/>
+              <a:t>Lý</a:t>
+            </a:r>
+            <a:r>
+              <a:rPr lang="en-US" dirty="0" smtClean="0"/>
+              <a:t> </a:t>
+            </a:r>
+            <a:r>
+              <a:rPr lang="en-US" dirty="0" err="1" smtClean="0"/>
+              <a:t>Dự</a:t>
+            </a:r>
+            <a:r>
+              <a:rPr lang="en-US" dirty="0" smtClean="0"/>
+              <a:t> </a:t>
+            </a:r>
+            <a:r>
+              <a:rPr lang="en-US" dirty="0" err="1" smtClean="0"/>
+              <a:t>Án</a:t>
+            </a:r>
+            <a:endParaRPr lang="en-US" dirty="0"/>
+          </a:p>
+        </p:txBody>
+      </p:sp>
+      <p:cxnSp>
+        <p:nvCxnSpPr>
+          <p:cNvPr id="26" name="Straight Arrow Connector 25"/>
+          <p:cNvCxnSpPr>
+            <a:stCxn id="54" idx="1"/>
+            <a:endCxn id="42" idx="3"/>
+          </p:cNvCxnSpPr>
+          <p:nvPr/>
+        </p:nvCxnSpPr>
+        <p:spPr>
+          <a:xfrm flipH="1">
+            <a:off x="3675552" y="428614"/>
+            <a:ext cx="1617416" cy="1015565"/>
+          </a:xfrm>
+          <a:prstGeom prst="straightConnector1">
+            <a:avLst/>
+          </a:prstGeom>
+          <a:ln>
+            <a:tailEnd type="triangle"/>
+          </a:ln>
+        </p:spPr>
+        <p:style>
+          <a:lnRef idx="1">
+            <a:schemeClr val="accent1"/>
+          </a:lnRef>
+          <a:fillRef idx="0">
+            <a:schemeClr val="accent1"/>
+          </a:fillRef>
+          <a:effectRef idx="0">
+            <a:schemeClr val="accent1"/>
+          </a:effectRef>
+          <a:fontRef idx="minor">
+            <a:schemeClr val="tx1"/>
+          </a:fontRef>
+        </p:style>
+      </p:cxnSp>
+      <p:cxnSp>
+        <p:nvCxnSpPr>
+          <p:cNvPr id="29" name="Straight Arrow Connector 28"/>
+          <p:cNvCxnSpPr>
+            <a:stCxn id="54" idx="3"/>
+            <a:endCxn id="44" idx="1"/>
+          </p:cNvCxnSpPr>
+          <p:nvPr/>
+        </p:nvCxnSpPr>
+        <p:spPr>
+          <a:xfrm>
+            <a:off x="7385537" y="428614"/>
+            <a:ext cx="1427288" cy="1015565"/>
+          </a:xfrm>
+          <a:prstGeom prst="straightConnector1">
+            <a:avLst/>
+          </a:prstGeom>
+          <a:ln>
+            <a:tailEnd type="triangle"/>
+          </a:ln>
+        </p:spPr>
+        <p:style>
+          <a:lnRef idx="1">
+            <a:schemeClr val="accent1"/>
+          </a:lnRef>
+          <a:fillRef idx="0">
+            <a:schemeClr val="accent1"/>
+          </a:fillRef>
+          <a:effectRef idx="0">
+            <a:schemeClr val="accent1"/>
+          </a:effectRef>
+          <a:fontRef idx="minor">
+            <a:schemeClr val="tx1"/>
+          </a:fontRef>
+        </p:style>
+      </p:cxnSp>
     </p:spTree>
     <p:extLst>
       <p:ext uri="{BB962C8B-B14F-4D97-AF65-F5344CB8AC3E}">

</xml_diff>